<commit_message>
Updated Overview to include link to GitHub repository
</commit_message>
<xml_diff>
--- a/Documentation/SOAR_Overview.pptx
+++ b/Documentation/SOAR_Overview.pptx
@@ -132,6 +132,352 @@
 
 <file path=ppt/changesInfos/changesInfo1.xml><?xml version="1.0" encoding="utf-8"?>
 <pc:chgInfo xmlns:a="http://schemas.openxmlformats.org/drawingml/2006/main" xmlns:r="http://schemas.openxmlformats.org/officeDocument/2006/relationships" xmlns:ac="http://schemas.microsoft.com/office/drawing/2013/main/command" xmlns:pc="http://schemas.microsoft.com/office/powerpoint/2013/main/command">
+  <pc:docChgLst>
+    <pc:chgData name="Jay Francis" userId="7f0e01936d3c0330" providerId="LiveId" clId="{539A5218-179D-456D-9953-E69A886FE625}"/>
+    <pc:docChg chg="undo custSel modSld sldOrd">
+      <pc:chgData name="Jay Francis" userId="7f0e01936d3c0330" providerId="LiveId" clId="{539A5218-179D-456D-9953-E69A886FE625}" dt="2022-07-19T14:48:01.063" v="1064" actId="20577"/>
+      <pc:docMkLst>
+        <pc:docMk/>
+      </pc:docMkLst>
+      <pc:sldChg chg="mod modShow">
+        <pc:chgData name="Jay Francis" userId="7f0e01936d3c0330" providerId="LiveId" clId="{539A5218-179D-456D-9953-E69A886FE625}" dt="2022-07-19T14:43:14.203" v="1057" actId="729"/>
+        <pc:sldMkLst>
+          <pc:docMk/>
+          <pc:sldMk cId="1544838494" sldId="371"/>
+        </pc:sldMkLst>
+      </pc:sldChg>
+      <pc:sldChg chg="addSp delSp modSp mod">
+        <pc:chgData name="Jay Francis" userId="7f0e01936d3c0330" providerId="LiveId" clId="{539A5218-179D-456D-9953-E69A886FE625}" dt="2022-07-19T14:48:01.063" v="1064" actId="20577"/>
+        <pc:sldMkLst>
+          <pc:docMk/>
+          <pc:sldMk cId="162092071" sldId="372"/>
+        </pc:sldMkLst>
+        <pc:spChg chg="mod">
+          <ac:chgData name="Jay Francis" userId="7f0e01936d3c0330" providerId="LiveId" clId="{539A5218-179D-456D-9953-E69A886FE625}" dt="2022-07-19T14:48:01.063" v="1064" actId="20577"/>
+          <ac:spMkLst>
+            <pc:docMk/>
+            <pc:sldMk cId="162092071" sldId="372"/>
+            <ac:spMk id="3" creationId="{42AFE50A-6F33-40AD-9446-D7F6D1B310CF}"/>
+          </ac:spMkLst>
+        </pc:spChg>
+        <pc:spChg chg="mod">
+          <ac:chgData name="Jay Francis" userId="7f0e01936d3c0330" providerId="LiveId" clId="{539A5218-179D-456D-9953-E69A886FE625}" dt="2022-07-19T14:12:51.853" v="3" actId="20577"/>
+          <ac:spMkLst>
+            <pc:docMk/>
+            <pc:sldMk cId="162092071" sldId="372"/>
+            <ac:spMk id="13" creationId="{A3967E21-B2F3-45A0-8DC7-5AA3CCC51699}"/>
+          </ac:spMkLst>
+        </pc:spChg>
+        <pc:spChg chg="add del mod">
+          <ac:chgData name="Jay Francis" userId="7f0e01936d3c0330" providerId="LiveId" clId="{539A5218-179D-456D-9953-E69A886FE625}" dt="2022-07-19T14:42:23.710" v="1050" actId="2711"/>
+          <ac:spMkLst>
+            <pc:docMk/>
+            <pc:sldMk cId="162092071" sldId="372"/>
+            <ac:spMk id="15" creationId="{E87B0019-071E-4C19-9139-35D5377D2C85}"/>
+          </ac:spMkLst>
+        </pc:spChg>
+      </pc:sldChg>
+      <pc:sldChg chg="mod modShow">
+        <pc:chgData name="Jay Francis" userId="7f0e01936d3c0330" providerId="LiveId" clId="{539A5218-179D-456D-9953-E69A886FE625}" dt="2022-07-19T14:43:14.203" v="1057" actId="729"/>
+        <pc:sldMkLst>
+          <pc:docMk/>
+          <pc:sldMk cId="3266076763" sldId="388"/>
+        </pc:sldMkLst>
+      </pc:sldChg>
+      <pc:sldChg chg="mod modShow">
+        <pc:chgData name="Jay Francis" userId="7f0e01936d3c0330" providerId="LiveId" clId="{539A5218-179D-456D-9953-E69A886FE625}" dt="2022-07-19T14:43:14.203" v="1057" actId="729"/>
+        <pc:sldMkLst>
+          <pc:docMk/>
+          <pc:sldMk cId="787300552" sldId="390"/>
+        </pc:sldMkLst>
+      </pc:sldChg>
+      <pc:sldChg chg="mod modShow">
+        <pc:chgData name="Jay Francis" userId="7f0e01936d3c0330" providerId="LiveId" clId="{539A5218-179D-456D-9953-E69A886FE625}" dt="2022-07-19T14:43:14.203" v="1057" actId="729"/>
+        <pc:sldMkLst>
+          <pc:docMk/>
+          <pc:sldMk cId="1279475182" sldId="391"/>
+        </pc:sldMkLst>
+      </pc:sldChg>
+      <pc:sldChg chg="mod modShow">
+        <pc:chgData name="Jay Francis" userId="7f0e01936d3c0330" providerId="LiveId" clId="{539A5218-179D-456D-9953-E69A886FE625}" dt="2022-07-19T14:43:14.203" v="1057" actId="729"/>
+        <pc:sldMkLst>
+          <pc:docMk/>
+          <pc:sldMk cId="4047162040" sldId="396"/>
+        </pc:sldMkLst>
+      </pc:sldChg>
+      <pc:sldChg chg="addSp delSp modSp mod ord">
+        <pc:chgData name="Jay Francis" userId="7f0e01936d3c0330" providerId="LiveId" clId="{539A5218-179D-456D-9953-E69A886FE625}" dt="2022-07-19T14:43:00.054" v="1055"/>
+        <pc:sldMkLst>
+          <pc:docMk/>
+          <pc:sldMk cId="637630954" sldId="400"/>
+        </pc:sldMkLst>
+        <pc:spChg chg="mod">
+          <ac:chgData name="Jay Francis" userId="7f0e01936d3c0330" providerId="LiveId" clId="{539A5218-179D-456D-9953-E69A886FE625}" dt="2022-07-19T14:30:52.690" v="795" actId="114"/>
+          <ac:spMkLst>
+            <pc:docMk/>
+            <pc:sldMk cId="637630954" sldId="400"/>
+            <ac:spMk id="2" creationId="{937EC466-2297-4C1B-8079-A514AB8D335D}"/>
+          </ac:spMkLst>
+        </pc:spChg>
+        <pc:spChg chg="mod">
+          <ac:chgData name="Jay Francis" userId="7f0e01936d3c0330" providerId="LiveId" clId="{539A5218-179D-456D-9953-E69A886FE625}" dt="2022-07-19T14:33:54.343" v="882" actId="20577"/>
+          <ac:spMkLst>
+            <pc:docMk/>
+            <pc:sldMk cId="637630954" sldId="400"/>
+            <ac:spMk id="3" creationId="{6CC87D86-1B97-419B-878E-C18BA725FF0A}"/>
+          </ac:spMkLst>
+        </pc:spChg>
+        <pc:spChg chg="add mod">
+          <ac:chgData name="Jay Francis" userId="7f0e01936d3c0330" providerId="LiveId" clId="{539A5218-179D-456D-9953-E69A886FE625}" dt="2022-07-19T14:43:00.054" v="1055"/>
+          <ac:spMkLst>
+            <pc:docMk/>
+            <pc:sldMk cId="637630954" sldId="400"/>
+            <ac:spMk id="12" creationId="{34563F0F-6579-8CB3-0295-7C2725B9654B}"/>
+          </ac:spMkLst>
+        </pc:spChg>
+        <pc:spChg chg="mod">
+          <ac:chgData name="Jay Francis" userId="7f0e01936d3c0330" providerId="LiveId" clId="{539A5218-179D-456D-9953-E69A886FE625}" dt="2022-07-19T14:29:23.206" v="776" actId="20577"/>
+          <ac:spMkLst>
+            <pc:docMk/>
+            <pc:sldMk cId="637630954" sldId="400"/>
+            <ac:spMk id="16" creationId="{6D298BC0-D1EE-4B8A-B546-4C8799240D8F}"/>
+          </ac:spMkLst>
+        </pc:spChg>
+        <pc:spChg chg="del">
+          <ac:chgData name="Jay Francis" userId="7f0e01936d3c0330" providerId="LiveId" clId="{539A5218-179D-456D-9953-E69A886FE625}" dt="2022-07-19T14:29:27.110" v="777" actId="478"/>
+          <ac:spMkLst>
+            <pc:docMk/>
+            <pc:sldMk cId="637630954" sldId="400"/>
+            <ac:spMk id="17" creationId="{7CF31D05-F197-49CC-87BE-4A7FEB81335F}"/>
+          </ac:spMkLst>
+        </pc:spChg>
+        <pc:spChg chg="del">
+          <ac:chgData name="Jay Francis" userId="7f0e01936d3c0330" providerId="LiveId" clId="{539A5218-179D-456D-9953-E69A886FE625}" dt="2022-07-19T14:29:14.262" v="765" actId="478"/>
+          <ac:spMkLst>
+            <pc:docMk/>
+            <pc:sldMk cId="637630954" sldId="400"/>
+            <ac:spMk id="18" creationId="{0CFCA4BA-5731-4BC1-9FF7-23403BFA938A}"/>
+          </ac:spMkLst>
+        </pc:spChg>
+      </pc:sldChg>
+      <pc:sldChg chg="modSp mod">
+        <pc:chgData name="Jay Francis" userId="7f0e01936d3c0330" providerId="LiveId" clId="{539A5218-179D-456D-9953-E69A886FE625}" dt="2022-07-19T14:44:25.094" v="1059" actId="20577"/>
+        <pc:sldMkLst>
+          <pc:docMk/>
+          <pc:sldMk cId="4107789351" sldId="403"/>
+        </pc:sldMkLst>
+        <pc:spChg chg="mod">
+          <ac:chgData name="Jay Francis" userId="7f0e01936d3c0330" providerId="LiveId" clId="{539A5218-179D-456D-9953-E69A886FE625}" dt="2022-07-19T14:44:25.094" v="1059" actId="20577"/>
+          <ac:spMkLst>
+            <pc:docMk/>
+            <pc:sldMk cId="4107789351" sldId="403"/>
+            <ac:spMk id="2" creationId="{C662048C-4193-46A7-B629-11E6AF3B6012}"/>
+          </ac:spMkLst>
+        </pc:spChg>
+        <pc:spChg chg="mod">
+          <ac:chgData name="Jay Francis" userId="7f0e01936d3c0330" providerId="LiveId" clId="{539A5218-179D-456D-9953-E69A886FE625}" dt="2022-07-19T14:14:10.949" v="20" actId="20577"/>
+          <ac:spMkLst>
+            <pc:docMk/>
+            <pc:sldMk cId="4107789351" sldId="403"/>
+            <ac:spMk id="7" creationId="{41490115-1BAA-41CB-8138-76ADEBC9E741}"/>
+          </ac:spMkLst>
+        </pc:spChg>
+        <pc:spChg chg="mod">
+          <ac:chgData name="Jay Francis" userId="7f0e01936d3c0330" providerId="LiveId" clId="{539A5218-179D-456D-9953-E69A886FE625}" dt="2022-07-19T14:42:51.373" v="1053" actId="2711"/>
+          <ac:spMkLst>
+            <pc:docMk/>
+            <pc:sldMk cId="4107789351" sldId="403"/>
+            <ac:spMk id="9" creationId="{0C9BB6B4-244E-4F86-BF5C-9354C21B6043}"/>
+          </ac:spMkLst>
+        </pc:spChg>
+      </pc:sldChg>
+      <pc:sldChg chg="mod modShow">
+        <pc:chgData name="Jay Francis" userId="7f0e01936d3c0330" providerId="LiveId" clId="{539A5218-179D-456D-9953-E69A886FE625}" dt="2022-07-19T14:43:14.203" v="1057" actId="729"/>
+        <pc:sldMkLst>
+          <pc:docMk/>
+          <pc:sldMk cId="2394014188" sldId="404"/>
+        </pc:sldMkLst>
+      </pc:sldChg>
+      <pc:sldChg chg="addSp delSp modSp mod ord">
+        <pc:chgData name="Jay Francis" userId="7f0e01936d3c0330" providerId="LiveId" clId="{539A5218-179D-456D-9953-E69A886FE625}" dt="2022-07-19T14:43:02.366" v="1056"/>
+        <pc:sldMkLst>
+          <pc:docMk/>
+          <pc:sldMk cId="1994895105" sldId="407"/>
+        </pc:sldMkLst>
+        <pc:spChg chg="mod">
+          <ac:chgData name="Jay Francis" userId="7f0e01936d3c0330" providerId="LiveId" clId="{539A5218-179D-456D-9953-E69A886FE625}" dt="2022-07-19T14:34:30.166" v="892" actId="2711"/>
+          <ac:spMkLst>
+            <pc:docMk/>
+            <pc:sldMk cId="1994895105" sldId="407"/>
+            <ac:spMk id="2" creationId="{D2F924B7-710C-4A57-8CFD-02AED0241E6D}"/>
+          </ac:spMkLst>
+        </pc:spChg>
+        <pc:spChg chg="mod">
+          <ac:chgData name="Jay Francis" userId="7f0e01936d3c0330" providerId="LiveId" clId="{539A5218-179D-456D-9953-E69A886FE625}" dt="2022-07-19T14:37:52.568" v="986" actId="3626"/>
+          <ac:spMkLst>
+            <pc:docMk/>
+            <pc:sldMk cId="1994895105" sldId="407"/>
+            <ac:spMk id="3" creationId="{C95A8907-8F83-4D28-A679-FA8F63B9A1BA}"/>
+          </ac:spMkLst>
+        </pc:spChg>
+        <pc:spChg chg="mod">
+          <ac:chgData name="Jay Francis" userId="7f0e01936d3c0330" providerId="LiveId" clId="{539A5218-179D-456D-9953-E69A886FE625}" dt="2022-07-19T14:35:09.127" v="944" actId="20577"/>
+          <ac:spMkLst>
+            <pc:docMk/>
+            <pc:sldMk cId="1994895105" sldId="407"/>
+            <ac:spMk id="7" creationId="{58677E1A-6EF4-4E0B-8465-B74A11B4EC5E}"/>
+          </ac:spMkLst>
+        </pc:spChg>
+        <pc:spChg chg="del">
+          <ac:chgData name="Jay Francis" userId="7f0e01936d3c0330" providerId="LiveId" clId="{539A5218-179D-456D-9953-E69A886FE625}" dt="2022-07-19T14:35:01.615" v="935" actId="478"/>
+          <ac:spMkLst>
+            <pc:docMk/>
+            <pc:sldMk cId="1994895105" sldId="407"/>
+            <ac:spMk id="8" creationId="{9B416018-B9FF-439D-B677-A6C1EE52C534}"/>
+          </ac:spMkLst>
+        </pc:spChg>
+        <pc:spChg chg="del">
+          <ac:chgData name="Jay Francis" userId="7f0e01936d3c0330" providerId="LiveId" clId="{539A5218-179D-456D-9953-E69A886FE625}" dt="2022-07-19T14:35:12.199" v="945" actId="478"/>
+          <ac:spMkLst>
+            <pc:docMk/>
+            <pc:sldMk cId="1994895105" sldId="407"/>
+            <ac:spMk id="9" creationId="{D9293E6D-52CE-414C-A9A9-7A3C0CE08934}"/>
+          </ac:spMkLst>
+        </pc:spChg>
+        <pc:spChg chg="add mod">
+          <ac:chgData name="Jay Francis" userId="7f0e01936d3c0330" providerId="LiveId" clId="{539A5218-179D-456D-9953-E69A886FE625}" dt="2022-07-19T14:43:02.366" v="1056"/>
+          <ac:spMkLst>
+            <pc:docMk/>
+            <pc:sldMk cId="1994895105" sldId="407"/>
+            <ac:spMk id="10" creationId="{4761C00A-E25B-4AB5-2C63-7D7B96A0FB73}"/>
+          </ac:spMkLst>
+        </pc:spChg>
+      </pc:sldChg>
+      <pc:sldChg chg="mod modShow">
+        <pc:chgData name="Jay Francis" userId="7f0e01936d3c0330" providerId="LiveId" clId="{539A5218-179D-456D-9953-E69A886FE625}" dt="2022-07-19T14:43:14.203" v="1057" actId="729"/>
+        <pc:sldMkLst>
+          <pc:docMk/>
+          <pc:sldMk cId="2875688276" sldId="409"/>
+        </pc:sldMkLst>
+      </pc:sldChg>
+      <pc:sldChg chg="addSp delSp modSp mod ord">
+        <pc:chgData name="Jay Francis" userId="7f0e01936d3c0330" providerId="LiveId" clId="{539A5218-179D-456D-9953-E69A886FE625}" dt="2022-07-19T14:44:28.990" v="1063" actId="20577"/>
+        <pc:sldMkLst>
+          <pc:docMk/>
+          <pc:sldMk cId="568354645" sldId="411"/>
+        </pc:sldMkLst>
+        <pc:spChg chg="mod">
+          <ac:chgData name="Jay Francis" userId="7f0e01936d3c0330" providerId="LiveId" clId="{539A5218-179D-456D-9953-E69A886FE625}" dt="2022-07-19T14:44:28.990" v="1063" actId="20577"/>
+          <ac:spMkLst>
+            <pc:docMk/>
+            <pc:sldMk cId="568354645" sldId="411"/>
+            <ac:spMk id="2" creationId="{AA584C88-9468-43F0-84FE-87E6F8995935}"/>
+          </ac:spMkLst>
+        </pc:spChg>
+        <pc:spChg chg="mod">
+          <ac:chgData name="Jay Francis" userId="7f0e01936d3c0330" providerId="LiveId" clId="{539A5218-179D-456D-9953-E69A886FE625}" dt="2022-07-19T14:29:32.686" v="779" actId="20577"/>
+          <ac:spMkLst>
+            <pc:docMk/>
+            <pc:sldMk cId="568354645" sldId="411"/>
+            <ac:spMk id="4" creationId="{F4567E44-A438-462D-80F7-973D8E22B234}"/>
+          </ac:spMkLst>
+        </pc:spChg>
+        <pc:spChg chg="del">
+          <ac:chgData name="Jay Francis" userId="7f0e01936d3c0330" providerId="LiveId" clId="{539A5218-179D-456D-9953-E69A886FE625}" dt="2022-07-19T14:16:30.197" v="42" actId="478"/>
+          <ac:spMkLst>
+            <pc:docMk/>
+            <pc:sldMk cId="568354645" sldId="411"/>
+            <ac:spMk id="5" creationId="{5DF60FF9-E837-4D2A-86A0-3B5D4D6449E3}"/>
+          </ac:spMkLst>
+        </pc:spChg>
+        <pc:spChg chg="del">
+          <ac:chgData name="Jay Francis" userId="7f0e01936d3c0330" providerId="LiveId" clId="{539A5218-179D-456D-9953-E69A886FE625}" dt="2022-07-19T14:16:33.143" v="43" actId="478"/>
+          <ac:spMkLst>
+            <pc:docMk/>
+            <pc:sldMk cId="568354645" sldId="411"/>
+            <ac:spMk id="6" creationId="{5A7A9107-342C-447F-BD0F-E20064E5FDA7}"/>
+          </ac:spMkLst>
+        </pc:spChg>
+        <pc:spChg chg="add mod">
+          <ac:chgData name="Jay Francis" userId="7f0e01936d3c0330" providerId="LiveId" clId="{539A5218-179D-456D-9953-E69A886FE625}" dt="2022-07-19T14:42:56.601" v="1054"/>
+          <ac:spMkLst>
+            <pc:docMk/>
+            <pc:sldMk cId="568354645" sldId="411"/>
+            <ac:spMk id="8" creationId="{B865684F-4125-4383-7B27-71DF29D4BD32}"/>
+          </ac:spMkLst>
+        </pc:spChg>
+        <pc:graphicFrameChg chg="mod">
+          <ac:chgData name="Jay Francis" userId="7f0e01936d3c0330" providerId="LiveId" clId="{539A5218-179D-456D-9953-E69A886FE625}" dt="2022-07-19T14:28:38.999" v="762" actId="20577"/>
+          <ac:graphicFrameMkLst>
+            <pc:docMk/>
+            <pc:sldMk cId="568354645" sldId="411"/>
+            <ac:graphicFrameMk id="7" creationId="{DCCF0814-D45B-4C2C-BB91-2CABE926997E}"/>
+          </ac:graphicFrameMkLst>
+        </pc:graphicFrameChg>
+      </pc:sldChg>
+      <pc:sldChg chg="delSp modSp mod">
+        <pc:chgData name="Jay Francis" userId="7f0e01936d3c0330" providerId="LiveId" clId="{539A5218-179D-456D-9953-E69A886FE625}" dt="2022-07-19T14:42:35.301" v="1051" actId="2711"/>
+        <pc:sldMkLst>
+          <pc:docMk/>
+          <pc:sldMk cId="3259080904" sldId="412"/>
+        </pc:sldMkLst>
+        <pc:spChg chg="mod">
+          <ac:chgData name="Jay Francis" userId="7f0e01936d3c0330" providerId="LiveId" clId="{539A5218-179D-456D-9953-E69A886FE625}" dt="2022-07-19T14:13:01.308" v="6" actId="20577"/>
+          <ac:spMkLst>
+            <pc:docMk/>
+            <pc:sldMk cId="3259080904" sldId="412"/>
+            <ac:spMk id="13" creationId="{A3967E21-B2F3-45A0-8DC7-5AA3CCC51699}"/>
+          </ac:spMkLst>
+        </pc:spChg>
+        <pc:spChg chg="del">
+          <ac:chgData name="Jay Francis" userId="7f0e01936d3c0330" providerId="LiveId" clId="{539A5218-179D-456D-9953-E69A886FE625}" dt="2022-07-19T14:10:58.095" v="0" actId="478"/>
+          <ac:spMkLst>
+            <pc:docMk/>
+            <pc:sldMk cId="3259080904" sldId="412"/>
+            <ac:spMk id="14" creationId="{F2598B45-0899-4C64-A088-FE0583534F45}"/>
+          </ac:spMkLst>
+        </pc:spChg>
+        <pc:spChg chg="mod">
+          <ac:chgData name="Jay Francis" userId="7f0e01936d3c0330" providerId="LiveId" clId="{539A5218-179D-456D-9953-E69A886FE625}" dt="2022-07-19T14:42:35.301" v="1051" actId="2711"/>
+          <ac:spMkLst>
+            <pc:docMk/>
+            <pc:sldMk cId="3259080904" sldId="412"/>
+            <ac:spMk id="15" creationId="{E87B0019-071E-4C19-9139-35D5377D2C85}"/>
+          </ac:spMkLst>
+        </pc:spChg>
+      </pc:sldChg>
+      <pc:sldChg chg="mod modShow">
+        <pc:chgData name="Jay Francis" userId="7f0e01936d3c0330" providerId="LiveId" clId="{539A5218-179D-456D-9953-E69A886FE625}" dt="2022-07-19T14:43:14.203" v="1057" actId="729"/>
+        <pc:sldMkLst>
+          <pc:docMk/>
+          <pc:sldMk cId="850753327" sldId="413"/>
+        </pc:sldMkLst>
+      </pc:sldChg>
+      <pc:sldChg chg="modSp mod">
+        <pc:chgData name="Jay Francis" userId="7f0e01936d3c0330" providerId="LiveId" clId="{539A5218-179D-456D-9953-E69A886FE625}" dt="2022-07-19T14:42:41.888" v="1052" actId="2711"/>
+        <pc:sldMkLst>
+          <pc:docMk/>
+          <pc:sldMk cId="3723203491" sldId="414"/>
+        </pc:sldMkLst>
+        <pc:spChg chg="mod">
+          <ac:chgData name="Jay Francis" userId="7f0e01936d3c0330" providerId="LiveId" clId="{539A5218-179D-456D-9953-E69A886FE625}" dt="2022-07-19T14:13:10.461" v="15" actId="20577"/>
+          <ac:spMkLst>
+            <pc:docMk/>
+            <pc:sldMk cId="3723203491" sldId="414"/>
+            <ac:spMk id="11" creationId="{A5C2B59E-52FE-4A9A-A8E9-376D22AACF20}"/>
+          </ac:spMkLst>
+        </pc:spChg>
+        <pc:spChg chg="mod">
+          <ac:chgData name="Jay Francis" userId="7f0e01936d3c0330" providerId="LiveId" clId="{539A5218-179D-456D-9953-E69A886FE625}" dt="2022-07-19T14:42:41.888" v="1052" actId="2711"/>
+          <ac:spMkLst>
+            <pc:docMk/>
+            <pc:sldMk cId="3723203491" sldId="414"/>
+            <ac:spMk id="13" creationId="{135C349A-D650-4791-866D-35668BC3F98A}"/>
+          </ac:spMkLst>
+        </pc:spChg>
+      </pc:sldChg>
+    </pc:docChg>
+  </pc:docChgLst>
   <pc:docChgLst>
     <pc:chgData name="Jay Francis" userId="7f0e01936d3c0330" providerId="LiveId" clId="{07A19B54-9AAA-48D4-A6F2-544C82B434E3}"/>
     <pc:docChg chg="delSld">
@@ -613,352 +959,6 @@
           </pc:spChg>
         </pc:sldLayoutChg>
       </pc:sldMasterChg>
-    </pc:docChg>
-  </pc:docChgLst>
-  <pc:docChgLst>
-    <pc:chgData name="Jay Francis" userId="7f0e01936d3c0330" providerId="LiveId" clId="{539A5218-179D-456D-9953-E69A886FE625}"/>
-    <pc:docChg chg="undo custSel modSld sldOrd">
-      <pc:chgData name="Jay Francis" userId="7f0e01936d3c0330" providerId="LiveId" clId="{539A5218-179D-456D-9953-E69A886FE625}" dt="2022-07-19T14:48:01.063" v="1064" actId="20577"/>
-      <pc:docMkLst>
-        <pc:docMk/>
-      </pc:docMkLst>
-      <pc:sldChg chg="mod modShow">
-        <pc:chgData name="Jay Francis" userId="7f0e01936d3c0330" providerId="LiveId" clId="{539A5218-179D-456D-9953-E69A886FE625}" dt="2022-07-19T14:43:14.203" v="1057" actId="729"/>
-        <pc:sldMkLst>
-          <pc:docMk/>
-          <pc:sldMk cId="1544838494" sldId="371"/>
-        </pc:sldMkLst>
-      </pc:sldChg>
-      <pc:sldChg chg="addSp delSp modSp mod">
-        <pc:chgData name="Jay Francis" userId="7f0e01936d3c0330" providerId="LiveId" clId="{539A5218-179D-456D-9953-E69A886FE625}" dt="2022-07-19T14:48:01.063" v="1064" actId="20577"/>
-        <pc:sldMkLst>
-          <pc:docMk/>
-          <pc:sldMk cId="162092071" sldId="372"/>
-        </pc:sldMkLst>
-        <pc:spChg chg="mod">
-          <ac:chgData name="Jay Francis" userId="7f0e01936d3c0330" providerId="LiveId" clId="{539A5218-179D-456D-9953-E69A886FE625}" dt="2022-07-19T14:48:01.063" v="1064" actId="20577"/>
-          <ac:spMkLst>
-            <pc:docMk/>
-            <pc:sldMk cId="162092071" sldId="372"/>
-            <ac:spMk id="3" creationId="{42AFE50A-6F33-40AD-9446-D7F6D1B310CF}"/>
-          </ac:spMkLst>
-        </pc:spChg>
-        <pc:spChg chg="mod">
-          <ac:chgData name="Jay Francis" userId="7f0e01936d3c0330" providerId="LiveId" clId="{539A5218-179D-456D-9953-E69A886FE625}" dt="2022-07-19T14:12:51.853" v="3" actId="20577"/>
-          <ac:spMkLst>
-            <pc:docMk/>
-            <pc:sldMk cId="162092071" sldId="372"/>
-            <ac:spMk id="13" creationId="{A3967E21-B2F3-45A0-8DC7-5AA3CCC51699}"/>
-          </ac:spMkLst>
-        </pc:spChg>
-        <pc:spChg chg="add del mod">
-          <ac:chgData name="Jay Francis" userId="7f0e01936d3c0330" providerId="LiveId" clId="{539A5218-179D-456D-9953-E69A886FE625}" dt="2022-07-19T14:42:23.710" v="1050" actId="2711"/>
-          <ac:spMkLst>
-            <pc:docMk/>
-            <pc:sldMk cId="162092071" sldId="372"/>
-            <ac:spMk id="15" creationId="{E87B0019-071E-4C19-9139-35D5377D2C85}"/>
-          </ac:spMkLst>
-        </pc:spChg>
-      </pc:sldChg>
-      <pc:sldChg chg="mod modShow">
-        <pc:chgData name="Jay Francis" userId="7f0e01936d3c0330" providerId="LiveId" clId="{539A5218-179D-456D-9953-E69A886FE625}" dt="2022-07-19T14:43:14.203" v="1057" actId="729"/>
-        <pc:sldMkLst>
-          <pc:docMk/>
-          <pc:sldMk cId="3266076763" sldId="388"/>
-        </pc:sldMkLst>
-      </pc:sldChg>
-      <pc:sldChg chg="mod modShow">
-        <pc:chgData name="Jay Francis" userId="7f0e01936d3c0330" providerId="LiveId" clId="{539A5218-179D-456D-9953-E69A886FE625}" dt="2022-07-19T14:43:14.203" v="1057" actId="729"/>
-        <pc:sldMkLst>
-          <pc:docMk/>
-          <pc:sldMk cId="787300552" sldId="390"/>
-        </pc:sldMkLst>
-      </pc:sldChg>
-      <pc:sldChg chg="mod modShow">
-        <pc:chgData name="Jay Francis" userId="7f0e01936d3c0330" providerId="LiveId" clId="{539A5218-179D-456D-9953-E69A886FE625}" dt="2022-07-19T14:43:14.203" v="1057" actId="729"/>
-        <pc:sldMkLst>
-          <pc:docMk/>
-          <pc:sldMk cId="1279475182" sldId="391"/>
-        </pc:sldMkLst>
-      </pc:sldChg>
-      <pc:sldChg chg="mod modShow">
-        <pc:chgData name="Jay Francis" userId="7f0e01936d3c0330" providerId="LiveId" clId="{539A5218-179D-456D-9953-E69A886FE625}" dt="2022-07-19T14:43:14.203" v="1057" actId="729"/>
-        <pc:sldMkLst>
-          <pc:docMk/>
-          <pc:sldMk cId="4047162040" sldId="396"/>
-        </pc:sldMkLst>
-      </pc:sldChg>
-      <pc:sldChg chg="addSp delSp modSp mod ord">
-        <pc:chgData name="Jay Francis" userId="7f0e01936d3c0330" providerId="LiveId" clId="{539A5218-179D-456D-9953-E69A886FE625}" dt="2022-07-19T14:43:00.054" v="1055"/>
-        <pc:sldMkLst>
-          <pc:docMk/>
-          <pc:sldMk cId="637630954" sldId="400"/>
-        </pc:sldMkLst>
-        <pc:spChg chg="mod">
-          <ac:chgData name="Jay Francis" userId="7f0e01936d3c0330" providerId="LiveId" clId="{539A5218-179D-456D-9953-E69A886FE625}" dt="2022-07-19T14:30:52.690" v="795" actId="114"/>
-          <ac:spMkLst>
-            <pc:docMk/>
-            <pc:sldMk cId="637630954" sldId="400"/>
-            <ac:spMk id="2" creationId="{937EC466-2297-4C1B-8079-A514AB8D335D}"/>
-          </ac:spMkLst>
-        </pc:spChg>
-        <pc:spChg chg="mod">
-          <ac:chgData name="Jay Francis" userId="7f0e01936d3c0330" providerId="LiveId" clId="{539A5218-179D-456D-9953-E69A886FE625}" dt="2022-07-19T14:33:54.343" v="882" actId="20577"/>
-          <ac:spMkLst>
-            <pc:docMk/>
-            <pc:sldMk cId="637630954" sldId="400"/>
-            <ac:spMk id="3" creationId="{6CC87D86-1B97-419B-878E-C18BA725FF0A}"/>
-          </ac:spMkLst>
-        </pc:spChg>
-        <pc:spChg chg="add mod">
-          <ac:chgData name="Jay Francis" userId="7f0e01936d3c0330" providerId="LiveId" clId="{539A5218-179D-456D-9953-E69A886FE625}" dt="2022-07-19T14:43:00.054" v="1055"/>
-          <ac:spMkLst>
-            <pc:docMk/>
-            <pc:sldMk cId="637630954" sldId="400"/>
-            <ac:spMk id="12" creationId="{34563F0F-6579-8CB3-0295-7C2725B9654B}"/>
-          </ac:spMkLst>
-        </pc:spChg>
-        <pc:spChg chg="mod">
-          <ac:chgData name="Jay Francis" userId="7f0e01936d3c0330" providerId="LiveId" clId="{539A5218-179D-456D-9953-E69A886FE625}" dt="2022-07-19T14:29:23.206" v="776" actId="20577"/>
-          <ac:spMkLst>
-            <pc:docMk/>
-            <pc:sldMk cId="637630954" sldId="400"/>
-            <ac:spMk id="16" creationId="{6D298BC0-D1EE-4B8A-B546-4C8799240D8F}"/>
-          </ac:spMkLst>
-        </pc:spChg>
-        <pc:spChg chg="del">
-          <ac:chgData name="Jay Francis" userId="7f0e01936d3c0330" providerId="LiveId" clId="{539A5218-179D-456D-9953-E69A886FE625}" dt="2022-07-19T14:29:27.110" v="777" actId="478"/>
-          <ac:spMkLst>
-            <pc:docMk/>
-            <pc:sldMk cId="637630954" sldId="400"/>
-            <ac:spMk id="17" creationId="{7CF31D05-F197-49CC-87BE-4A7FEB81335F}"/>
-          </ac:spMkLst>
-        </pc:spChg>
-        <pc:spChg chg="del">
-          <ac:chgData name="Jay Francis" userId="7f0e01936d3c0330" providerId="LiveId" clId="{539A5218-179D-456D-9953-E69A886FE625}" dt="2022-07-19T14:29:14.262" v="765" actId="478"/>
-          <ac:spMkLst>
-            <pc:docMk/>
-            <pc:sldMk cId="637630954" sldId="400"/>
-            <ac:spMk id="18" creationId="{0CFCA4BA-5731-4BC1-9FF7-23403BFA938A}"/>
-          </ac:spMkLst>
-        </pc:spChg>
-      </pc:sldChg>
-      <pc:sldChg chg="modSp mod">
-        <pc:chgData name="Jay Francis" userId="7f0e01936d3c0330" providerId="LiveId" clId="{539A5218-179D-456D-9953-E69A886FE625}" dt="2022-07-19T14:44:25.094" v="1059" actId="20577"/>
-        <pc:sldMkLst>
-          <pc:docMk/>
-          <pc:sldMk cId="4107789351" sldId="403"/>
-        </pc:sldMkLst>
-        <pc:spChg chg="mod">
-          <ac:chgData name="Jay Francis" userId="7f0e01936d3c0330" providerId="LiveId" clId="{539A5218-179D-456D-9953-E69A886FE625}" dt="2022-07-19T14:44:25.094" v="1059" actId="20577"/>
-          <ac:spMkLst>
-            <pc:docMk/>
-            <pc:sldMk cId="4107789351" sldId="403"/>
-            <ac:spMk id="2" creationId="{C662048C-4193-46A7-B629-11E6AF3B6012}"/>
-          </ac:spMkLst>
-        </pc:spChg>
-        <pc:spChg chg="mod">
-          <ac:chgData name="Jay Francis" userId="7f0e01936d3c0330" providerId="LiveId" clId="{539A5218-179D-456D-9953-E69A886FE625}" dt="2022-07-19T14:14:10.949" v="20" actId="20577"/>
-          <ac:spMkLst>
-            <pc:docMk/>
-            <pc:sldMk cId="4107789351" sldId="403"/>
-            <ac:spMk id="7" creationId="{41490115-1BAA-41CB-8138-76ADEBC9E741}"/>
-          </ac:spMkLst>
-        </pc:spChg>
-        <pc:spChg chg="mod">
-          <ac:chgData name="Jay Francis" userId="7f0e01936d3c0330" providerId="LiveId" clId="{539A5218-179D-456D-9953-E69A886FE625}" dt="2022-07-19T14:42:51.373" v="1053" actId="2711"/>
-          <ac:spMkLst>
-            <pc:docMk/>
-            <pc:sldMk cId="4107789351" sldId="403"/>
-            <ac:spMk id="9" creationId="{0C9BB6B4-244E-4F86-BF5C-9354C21B6043}"/>
-          </ac:spMkLst>
-        </pc:spChg>
-      </pc:sldChg>
-      <pc:sldChg chg="mod modShow">
-        <pc:chgData name="Jay Francis" userId="7f0e01936d3c0330" providerId="LiveId" clId="{539A5218-179D-456D-9953-E69A886FE625}" dt="2022-07-19T14:43:14.203" v="1057" actId="729"/>
-        <pc:sldMkLst>
-          <pc:docMk/>
-          <pc:sldMk cId="2394014188" sldId="404"/>
-        </pc:sldMkLst>
-      </pc:sldChg>
-      <pc:sldChg chg="addSp delSp modSp mod ord">
-        <pc:chgData name="Jay Francis" userId="7f0e01936d3c0330" providerId="LiveId" clId="{539A5218-179D-456D-9953-E69A886FE625}" dt="2022-07-19T14:43:02.366" v="1056"/>
-        <pc:sldMkLst>
-          <pc:docMk/>
-          <pc:sldMk cId="1994895105" sldId="407"/>
-        </pc:sldMkLst>
-        <pc:spChg chg="mod">
-          <ac:chgData name="Jay Francis" userId="7f0e01936d3c0330" providerId="LiveId" clId="{539A5218-179D-456D-9953-E69A886FE625}" dt="2022-07-19T14:34:30.166" v="892" actId="2711"/>
-          <ac:spMkLst>
-            <pc:docMk/>
-            <pc:sldMk cId="1994895105" sldId="407"/>
-            <ac:spMk id="2" creationId="{D2F924B7-710C-4A57-8CFD-02AED0241E6D}"/>
-          </ac:spMkLst>
-        </pc:spChg>
-        <pc:spChg chg="mod">
-          <ac:chgData name="Jay Francis" userId="7f0e01936d3c0330" providerId="LiveId" clId="{539A5218-179D-456D-9953-E69A886FE625}" dt="2022-07-19T14:37:52.568" v="986" actId="3626"/>
-          <ac:spMkLst>
-            <pc:docMk/>
-            <pc:sldMk cId="1994895105" sldId="407"/>
-            <ac:spMk id="3" creationId="{C95A8907-8F83-4D28-A679-FA8F63B9A1BA}"/>
-          </ac:spMkLst>
-        </pc:spChg>
-        <pc:spChg chg="mod">
-          <ac:chgData name="Jay Francis" userId="7f0e01936d3c0330" providerId="LiveId" clId="{539A5218-179D-456D-9953-E69A886FE625}" dt="2022-07-19T14:35:09.127" v="944" actId="20577"/>
-          <ac:spMkLst>
-            <pc:docMk/>
-            <pc:sldMk cId="1994895105" sldId="407"/>
-            <ac:spMk id="7" creationId="{58677E1A-6EF4-4E0B-8465-B74A11B4EC5E}"/>
-          </ac:spMkLst>
-        </pc:spChg>
-        <pc:spChg chg="del">
-          <ac:chgData name="Jay Francis" userId="7f0e01936d3c0330" providerId="LiveId" clId="{539A5218-179D-456D-9953-E69A886FE625}" dt="2022-07-19T14:35:01.615" v="935" actId="478"/>
-          <ac:spMkLst>
-            <pc:docMk/>
-            <pc:sldMk cId="1994895105" sldId="407"/>
-            <ac:spMk id="8" creationId="{9B416018-B9FF-439D-B677-A6C1EE52C534}"/>
-          </ac:spMkLst>
-        </pc:spChg>
-        <pc:spChg chg="del">
-          <ac:chgData name="Jay Francis" userId="7f0e01936d3c0330" providerId="LiveId" clId="{539A5218-179D-456D-9953-E69A886FE625}" dt="2022-07-19T14:35:12.199" v="945" actId="478"/>
-          <ac:spMkLst>
-            <pc:docMk/>
-            <pc:sldMk cId="1994895105" sldId="407"/>
-            <ac:spMk id="9" creationId="{D9293E6D-52CE-414C-A9A9-7A3C0CE08934}"/>
-          </ac:spMkLst>
-        </pc:spChg>
-        <pc:spChg chg="add mod">
-          <ac:chgData name="Jay Francis" userId="7f0e01936d3c0330" providerId="LiveId" clId="{539A5218-179D-456D-9953-E69A886FE625}" dt="2022-07-19T14:43:02.366" v="1056"/>
-          <ac:spMkLst>
-            <pc:docMk/>
-            <pc:sldMk cId="1994895105" sldId="407"/>
-            <ac:spMk id="10" creationId="{4761C00A-E25B-4AB5-2C63-7D7B96A0FB73}"/>
-          </ac:spMkLst>
-        </pc:spChg>
-      </pc:sldChg>
-      <pc:sldChg chg="mod modShow">
-        <pc:chgData name="Jay Francis" userId="7f0e01936d3c0330" providerId="LiveId" clId="{539A5218-179D-456D-9953-E69A886FE625}" dt="2022-07-19T14:43:14.203" v="1057" actId="729"/>
-        <pc:sldMkLst>
-          <pc:docMk/>
-          <pc:sldMk cId="2875688276" sldId="409"/>
-        </pc:sldMkLst>
-      </pc:sldChg>
-      <pc:sldChg chg="addSp delSp modSp mod ord">
-        <pc:chgData name="Jay Francis" userId="7f0e01936d3c0330" providerId="LiveId" clId="{539A5218-179D-456D-9953-E69A886FE625}" dt="2022-07-19T14:44:28.990" v="1063" actId="20577"/>
-        <pc:sldMkLst>
-          <pc:docMk/>
-          <pc:sldMk cId="568354645" sldId="411"/>
-        </pc:sldMkLst>
-        <pc:spChg chg="mod">
-          <ac:chgData name="Jay Francis" userId="7f0e01936d3c0330" providerId="LiveId" clId="{539A5218-179D-456D-9953-E69A886FE625}" dt="2022-07-19T14:44:28.990" v="1063" actId="20577"/>
-          <ac:spMkLst>
-            <pc:docMk/>
-            <pc:sldMk cId="568354645" sldId="411"/>
-            <ac:spMk id="2" creationId="{AA584C88-9468-43F0-84FE-87E6F8995935}"/>
-          </ac:spMkLst>
-        </pc:spChg>
-        <pc:spChg chg="mod">
-          <ac:chgData name="Jay Francis" userId="7f0e01936d3c0330" providerId="LiveId" clId="{539A5218-179D-456D-9953-E69A886FE625}" dt="2022-07-19T14:29:32.686" v="779" actId="20577"/>
-          <ac:spMkLst>
-            <pc:docMk/>
-            <pc:sldMk cId="568354645" sldId="411"/>
-            <ac:spMk id="4" creationId="{F4567E44-A438-462D-80F7-973D8E22B234}"/>
-          </ac:spMkLst>
-        </pc:spChg>
-        <pc:spChg chg="del">
-          <ac:chgData name="Jay Francis" userId="7f0e01936d3c0330" providerId="LiveId" clId="{539A5218-179D-456D-9953-E69A886FE625}" dt="2022-07-19T14:16:30.197" v="42" actId="478"/>
-          <ac:spMkLst>
-            <pc:docMk/>
-            <pc:sldMk cId="568354645" sldId="411"/>
-            <ac:spMk id="5" creationId="{5DF60FF9-E837-4D2A-86A0-3B5D4D6449E3}"/>
-          </ac:spMkLst>
-        </pc:spChg>
-        <pc:spChg chg="del">
-          <ac:chgData name="Jay Francis" userId="7f0e01936d3c0330" providerId="LiveId" clId="{539A5218-179D-456D-9953-E69A886FE625}" dt="2022-07-19T14:16:33.143" v="43" actId="478"/>
-          <ac:spMkLst>
-            <pc:docMk/>
-            <pc:sldMk cId="568354645" sldId="411"/>
-            <ac:spMk id="6" creationId="{5A7A9107-342C-447F-BD0F-E20064E5FDA7}"/>
-          </ac:spMkLst>
-        </pc:spChg>
-        <pc:spChg chg="add mod">
-          <ac:chgData name="Jay Francis" userId="7f0e01936d3c0330" providerId="LiveId" clId="{539A5218-179D-456D-9953-E69A886FE625}" dt="2022-07-19T14:42:56.601" v="1054"/>
-          <ac:spMkLst>
-            <pc:docMk/>
-            <pc:sldMk cId="568354645" sldId="411"/>
-            <ac:spMk id="8" creationId="{B865684F-4125-4383-7B27-71DF29D4BD32}"/>
-          </ac:spMkLst>
-        </pc:spChg>
-        <pc:graphicFrameChg chg="mod">
-          <ac:chgData name="Jay Francis" userId="7f0e01936d3c0330" providerId="LiveId" clId="{539A5218-179D-456D-9953-E69A886FE625}" dt="2022-07-19T14:28:38.999" v="762" actId="20577"/>
-          <ac:graphicFrameMkLst>
-            <pc:docMk/>
-            <pc:sldMk cId="568354645" sldId="411"/>
-            <ac:graphicFrameMk id="7" creationId="{DCCF0814-D45B-4C2C-BB91-2CABE926997E}"/>
-          </ac:graphicFrameMkLst>
-        </pc:graphicFrameChg>
-      </pc:sldChg>
-      <pc:sldChg chg="delSp modSp mod">
-        <pc:chgData name="Jay Francis" userId="7f0e01936d3c0330" providerId="LiveId" clId="{539A5218-179D-456D-9953-E69A886FE625}" dt="2022-07-19T14:42:35.301" v="1051" actId="2711"/>
-        <pc:sldMkLst>
-          <pc:docMk/>
-          <pc:sldMk cId="3259080904" sldId="412"/>
-        </pc:sldMkLst>
-        <pc:spChg chg="mod">
-          <ac:chgData name="Jay Francis" userId="7f0e01936d3c0330" providerId="LiveId" clId="{539A5218-179D-456D-9953-E69A886FE625}" dt="2022-07-19T14:13:01.308" v="6" actId="20577"/>
-          <ac:spMkLst>
-            <pc:docMk/>
-            <pc:sldMk cId="3259080904" sldId="412"/>
-            <ac:spMk id="13" creationId="{A3967E21-B2F3-45A0-8DC7-5AA3CCC51699}"/>
-          </ac:spMkLst>
-        </pc:spChg>
-        <pc:spChg chg="del">
-          <ac:chgData name="Jay Francis" userId="7f0e01936d3c0330" providerId="LiveId" clId="{539A5218-179D-456D-9953-E69A886FE625}" dt="2022-07-19T14:10:58.095" v="0" actId="478"/>
-          <ac:spMkLst>
-            <pc:docMk/>
-            <pc:sldMk cId="3259080904" sldId="412"/>
-            <ac:spMk id="14" creationId="{F2598B45-0899-4C64-A088-FE0583534F45}"/>
-          </ac:spMkLst>
-        </pc:spChg>
-        <pc:spChg chg="mod">
-          <ac:chgData name="Jay Francis" userId="7f0e01936d3c0330" providerId="LiveId" clId="{539A5218-179D-456D-9953-E69A886FE625}" dt="2022-07-19T14:42:35.301" v="1051" actId="2711"/>
-          <ac:spMkLst>
-            <pc:docMk/>
-            <pc:sldMk cId="3259080904" sldId="412"/>
-            <ac:spMk id="15" creationId="{E87B0019-071E-4C19-9139-35D5377D2C85}"/>
-          </ac:spMkLst>
-        </pc:spChg>
-      </pc:sldChg>
-      <pc:sldChg chg="mod modShow">
-        <pc:chgData name="Jay Francis" userId="7f0e01936d3c0330" providerId="LiveId" clId="{539A5218-179D-456D-9953-E69A886FE625}" dt="2022-07-19T14:43:14.203" v="1057" actId="729"/>
-        <pc:sldMkLst>
-          <pc:docMk/>
-          <pc:sldMk cId="850753327" sldId="413"/>
-        </pc:sldMkLst>
-      </pc:sldChg>
-      <pc:sldChg chg="modSp mod">
-        <pc:chgData name="Jay Francis" userId="7f0e01936d3c0330" providerId="LiveId" clId="{539A5218-179D-456D-9953-E69A886FE625}" dt="2022-07-19T14:42:41.888" v="1052" actId="2711"/>
-        <pc:sldMkLst>
-          <pc:docMk/>
-          <pc:sldMk cId="3723203491" sldId="414"/>
-        </pc:sldMkLst>
-        <pc:spChg chg="mod">
-          <ac:chgData name="Jay Francis" userId="7f0e01936d3c0330" providerId="LiveId" clId="{539A5218-179D-456D-9953-E69A886FE625}" dt="2022-07-19T14:13:10.461" v="15" actId="20577"/>
-          <ac:spMkLst>
-            <pc:docMk/>
-            <pc:sldMk cId="3723203491" sldId="414"/>
-            <ac:spMk id="11" creationId="{A5C2B59E-52FE-4A9A-A8E9-376D22AACF20}"/>
-          </ac:spMkLst>
-        </pc:spChg>
-        <pc:spChg chg="mod">
-          <ac:chgData name="Jay Francis" userId="7f0e01936d3c0330" providerId="LiveId" clId="{539A5218-179D-456D-9953-E69A886FE625}" dt="2022-07-19T14:42:41.888" v="1052" actId="2711"/>
-          <ac:spMkLst>
-            <pc:docMk/>
-            <pc:sldMk cId="3723203491" sldId="414"/>
-            <ac:spMk id="13" creationId="{135C349A-D650-4791-866D-35668BC3F98A}"/>
-          </ac:spMkLst>
-        </pc:spChg>
-      </pc:sldChg>
     </pc:docChg>
   </pc:docChgLst>
 </pc:chgInfo>
@@ -20645,6 +20645,12 @@
             </a:r>
           </a:p>
           <a:p>
+            <a:r>
+              <a:rPr lang="en-US" dirty="0"/>
+              <a:t>https://github.com/robojay/SOAR</a:t>
+            </a:r>
+          </a:p>
+          <a:p>
             <a:endParaRPr lang="en-US" dirty="0"/>
           </a:p>
         </p:txBody>
@@ -21231,6 +21237,25 @@
 </file>
 
 <file path=customXml/item1.xml><?xml version="1.0" encoding="utf-8"?>
+<p:properties xmlns:p="http://schemas.microsoft.com/office/2006/metadata/properties" xmlns:xsi="http://www.w3.org/2001/XMLSchema-instance" xmlns:pc="http://schemas.microsoft.com/office/infopath/2007/PartnerControls">
+  <documentManagement>
+    <Status xmlns="71af3243-3dd4-4a8d-8c0d-dd76da1f02a5">Not started</Status>
+    <_ip_UnifiedCompliancePolicyUIAction xmlns="http://schemas.microsoft.com/sharepoint/v3" xsi:nil="true"/>
+    <Image xmlns="71af3243-3dd4-4a8d-8c0d-dd76da1f02a5">
+      <Url xsi:nil="true"/>
+      <Description xsi:nil="true"/>
+    </Image>
+    <_ip_UnifiedCompliancePolicyProperties xmlns="http://schemas.microsoft.com/sharepoint/v3" xsi:nil="true"/>
+    <lcf76f155ced4ddcb4097134ff3c332f xmlns="71af3243-3dd4-4a8d-8c0d-dd76da1f02a5">
+      <Terms xmlns="http://schemas.microsoft.com/office/infopath/2007/PartnerControls"/>
+    </lcf76f155ced4ddcb4097134ff3c332f>
+    <TaxCatchAll xmlns="230e9df3-be65-4c73-a93b-d1236ebd677e"/>
+    <MediaServiceKeyPoints xmlns="71af3243-3dd4-4a8d-8c0d-dd76da1f02a5" xsi:nil="true"/>
+  </documentManagement>
+</p:properties>
+</file>
+
+<file path=customXml/item2.xml><?xml version="1.0" encoding="utf-8"?>
 <ct:contentTypeSchema xmlns:ct="http://schemas.microsoft.com/office/2006/metadata/contentType" xmlns:ma="http://schemas.microsoft.com/office/2006/metadata/properties/metaAttributes" ct:_="" ma:_="" ma:contentTypeName="Document" ma:contentTypeID="0x01010079F111ED35F8CC479449609E8A0923A6" ma:contentTypeVersion="18" ma:contentTypeDescription="Create a new document." ma:contentTypeScope="" ma:versionID="22a266b9fa9a230c5a512669d8b298c3">
   <xsd:schema xmlns:xsd="http://www.w3.org/2001/XMLSchema" xmlns:xs="http://www.w3.org/2001/XMLSchema" xmlns:p="http://schemas.microsoft.com/office/2006/metadata/properties" xmlns:ns1="http://schemas.microsoft.com/sharepoint/v3" xmlns:ns2="71af3243-3dd4-4a8d-8c0d-dd76da1f02a5" xmlns:ns3="16c05727-aa75-4e4a-9b5f-8a80a1165891" xmlns:ns4="230e9df3-be65-4c73-a93b-d1236ebd677e" targetNamespace="http://schemas.microsoft.com/office/2006/metadata/properties" ma:root="true" ma:fieldsID="eddc33fff6b14141ee5c74a0d29ea6a1" ns1:_="" ns2:_="" ns3:_="" ns4:_="">
     <xsd:import namespace="http://schemas.microsoft.com/sharepoint/v3"/>
@@ -21506,25 +21531,6 @@
 </ct:contentTypeSchema>
 </file>
 
-<file path=customXml/item2.xml><?xml version="1.0" encoding="utf-8"?>
-<p:properties xmlns:p="http://schemas.microsoft.com/office/2006/metadata/properties" xmlns:xsi="http://www.w3.org/2001/XMLSchema-instance" xmlns:pc="http://schemas.microsoft.com/office/infopath/2007/PartnerControls">
-  <documentManagement>
-    <Status xmlns="71af3243-3dd4-4a8d-8c0d-dd76da1f02a5">Not started</Status>
-    <_ip_UnifiedCompliancePolicyUIAction xmlns="http://schemas.microsoft.com/sharepoint/v3" xsi:nil="true"/>
-    <Image xmlns="71af3243-3dd4-4a8d-8c0d-dd76da1f02a5">
-      <Url xsi:nil="true"/>
-      <Description xsi:nil="true"/>
-    </Image>
-    <_ip_UnifiedCompliancePolicyProperties xmlns="http://schemas.microsoft.com/sharepoint/v3" xsi:nil="true"/>
-    <lcf76f155ced4ddcb4097134ff3c332f xmlns="71af3243-3dd4-4a8d-8c0d-dd76da1f02a5">
-      <Terms xmlns="http://schemas.microsoft.com/office/infopath/2007/PartnerControls"/>
-    </lcf76f155ced4ddcb4097134ff3c332f>
-    <TaxCatchAll xmlns="230e9df3-be65-4c73-a93b-d1236ebd677e"/>
-    <MediaServiceKeyPoints xmlns="71af3243-3dd4-4a8d-8c0d-dd76da1f02a5" xsi:nil="true"/>
-  </documentManagement>
-</p:properties>
-</file>
-
 <file path=customXml/item3.xml><?xml version="1.0" encoding="utf-8"?>
 <?mso-contentType ?>
 <FormTemplates xmlns="http://schemas.microsoft.com/sharepoint/v3/contenttype/forms">
@@ -21535,6 +21541,25 @@
 </file>
 
 <file path=customXml/itemProps1.xml><?xml version="1.0" encoding="utf-8"?>
+<ds:datastoreItem xmlns:ds="http://schemas.openxmlformats.org/officeDocument/2006/customXml" ds:itemID="{4EAB8BBB-9A18-4050-923B-7FC6E36DA496}">
+  <ds:schemaRefs>
+    <ds:schemaRef ds:uri="http://purl.org/dc/terms/"/>
+    <ds:schemaRef ds:uri="71af3243-3dd4-4a8d-8c0d-dd76da1f02a5"/>
+    <ds:schemaRef ds:uri="16c05727-aa75-4e4a-9b5f-8a80a1165891"/>
+    <ds:schemaRef ds:uri="http://purl.org/dc/elements/1.1/"/>
+    <ds:schemaRef ds:uri="http://purl.org/dc/dcmitype/"/>
+    <ds:schemaRef ds:uri="http://schemas.microsoft.com/office/2006/documentManagement/types"/>
+    <ds:schemaRef ds:uri="230e9df3-be65-4c73-a93b-d1236ebd677e"/>
+    <ds:schemaRef ds:uri="http://schemas.microsoft.com/office/infopath/2007/PartnerControls"/>
+    <ds:schemaRef ds:uri="http://schemas.openxmlformats.org/package/2006/metadata/core-properties"/>
+    <ds:schemaRef ds:uri="http://schemas.microsoft.com/sharepoint/v3"/>
+    <ds:schemaRef ds:uri="http://schemas.microsoft.com/office/2006/metadata/properties"/>
+    <ds:schemaRef ds:uri="http://www.w3.org/XML/1998/namespace"/>
+  </ds:schemaRefs>
+</ds:datastoreItem>
+</file>
+
+<file path=customXml/itemProps2.xml><?xml version="1.0" encoding="utf-8"?>
 <ds:datastoreItem xmlns:ds="http://schemas.openxmlformats.org/officeDocument/2006/customXml" ds:itemID="{5BD36D06-4CB7-4DF0-BC60-E9BFBDAC456D}">
   <ds:schemaRefs>
     <ds:schemaRef ds:uri="http://schemas.microsoft.com/office/2006/metadata/contentType"/>
@@ -21555,25 +21580,6 @@
 </ds:datastoreItem>
 </file>
 
-<file path=customXml/itemProps2.xml><?xml version="1.0" encoding="utf-8"?>
-<ds:datastoreItem xmlns:ds="http://schemas.openxmlformats.org/officeDocument/2006/customXml" ds:itemID="{4EAB8BBB-9A18-4050-923B-7FC6E36DA496}">
-  <ds:schemaRefs>
-    <ds:schemaRef ds:uri="http://purl.org/dc/terms/"/>
-    <ds:schemaRef ds:uri="71af3243-3dd4-4a8d-8c0d-dd76da1f02a5"/>
-    <ds:schemaRef ds:uri="16c05727-aa75-4e4a-9b5f-8a80a1165891"/>
-    <ds:schemaRef ds:uri="http://purl.org/dc/elements/1.1/"/>
-    <ds:schemaRef ds:uri="http://purl.org/dc/dcmitype/"/>
-    <ds:schemaRef ds:uri="http://schemas.microsoft.com/office/2006/documentManagement/types"/>
-    <ds:schemaRef ds:uri="230e9df3-be65-4c73-a93b-d1236ebd677e"/>
-    <ds:schemaRef ds:uri="http://schemas.microsoft.com/office/infopath/2007/PartnerControls"/>
-    <ds:schemaRef ds:uri="http://schemas.openxmlformats.org/package/2006/metadata/core-properties"/>
-    <ds:schemaRef ds:uri="http://schemas.microsoft.com/sharepoint/v3"/>
-    <ds:schemaRef ds:uri="http://schemas.microsoft.com/office/2006/metadata/properties"/>
-    <ds:schemaRef ds:uri="http://www.w3.org/XML/1998/namespace"/>
-  </ds:schemaRefs>
-</ds:datastoreItem>
-</file>
-
 <file path=customXml/itemProps3.xml><?xml version="1.0" encoding="utf-8"?>
 <ds:datastoreItem xmlns:ds="http://schemas.openxmlformats.org/officeDocument/2006/customXml" ds:itemID="{0B61E4D0-D101-4A17-BA61-F29B2B6CFE74}">
   <ds:schemaRefs>

</xml_diff>

<commit_message>
Narrowed down modulation modes, included power and antenna info, relabled mission pages to SOAR-1
</commit_message>
<xml_diff>
--- a/Documentation/SOAR_Overview.pptx
+++ b/Documentation/SOAR_Overview.pptx
@@ -5615,7 +5615,7 @@
           <a:p>
             <a:fld id="{334AB06A-EEDC-421C-B5A0-5E9E5241A8E5}" type="datetimeFigureOut">
               <a:rPr lang="en-US" smtClean="0"/>
-              <a:t>7/19/2022</a:t>
+              <a:t>10/3/2022</a:t>
             </a:fld>
             <a:endParaRPr lang="en-US" dirty="0"/>
           </a:p>
@@ -18824,7 +18824,7 @@
           <a:p>
             <a:r>
               <a:rPr lang="en-US" dirty="0"/>
-              <a:t>7/19/2022</a:t>
+              <a:t>10/3/2022</a:t>
             </a:r>
           </a:p>
         </p:txBody>
@@ -19054,7 +19054,7 @@
           <a:p>
             <a:r>
               <a:rPr lang="en-US" dirty="0"/>
-              <a:t>7/19/2022</a:t>
+              <a:t>10/3/2022</a:t>
             </a:r>
           </a:p>
         </p:txBody>
@@ -19633,7 +19633,7 @@
           <a:p>
             <a:r>
               <a:rPr lang="en-US" dirty="0"/>
-              <a:t>7/19/2022</a:t>
+              <a:t>10/3/2022</a:t>
             </a:r>
           </a:p>
         </p:txBody>
@@ -19737,7 +19737,7 @@
               <a:rPr lang="en-US" i="1" dirty="0">
                 <a:latin typeface="Arial Black" panose="020B0A04020102020204" pitchFamily="34" charset="0"/>
               </a:rPr>
-              <a:t>SOAR</a:t>
+              <a:t>SOAR-1 Mission</a:t>
             </a:r>
           </a:p>
         </p:txBody>
@@ -19799,7 +19799,7 @@
         </p:spPr>
         <p:txBody>
           <a:bodyPr>
-            <a:normAutofit/>
+            <a:normAutofit fontScale="85000" lnSpcReduction="10000"/>
           </a:bodyPr>
           <a:lstStyle/>
           <a:p>
@@ -19819,13 +19819,19 @@
           <a:p>
             <a:r>
               <a:rPr lang="en-US" dirty="0"/>
-              <a:t>Modulation via LoRa, FSK, GFSK, MSK, OOK and FM voice modes are possible</a:t>
+              <a:t>Modulation via LoRa, CW, and FM voice will be performed in the 70cm amateur band (430-435 MHz)</a:t>
             </a:r>
           </a:p>
           <a:p>
             <a:r>
               <a:rPr lang="en-US" dirty="0"/>
-              <a:t>Test pattern data will be transmitted from the payload using different modes cycled in a predictable pattern</a:t>
+              <a:t>Maximum output power of 1W or 100mW (TBD) into a 0dBi omnidirectional antenna</a:t>
+            </a:r>
+          </a:p>
+          <a:p>
+            <a:r>
+              <a:rPr lang="en-US" dirty="0"/>
+              <a:t>Test pattern data will be transmitted from the payload using different LoRa modes cycled in a predictable pattern</a:t>
             </a:r>
           </a:p>
           <a:p>
@@ -19890,7 +19896,7 @@
         </p:spPr>
         <p:txBody>
           <a:bodyPr>
-            <a:normAutofit/>
+            <a:normAutofit fontScale="85000" lnSpcReduction="10000"/>
           </a:bodyPr>
           <a:lstStyle/>
           <a:p>
@@ -19943,7 +19949,7 @@
           <a:p>
             <a:r>
               <a:rPr lang="en-US" dirty="0"/>
-              <a:t>7/19/2022</a:t>
+              <a:t>10/3/2022</a:t>
             </a:r>
           </a:p>
         </p:txBody>
@@ -20047,7 +20053,7 @@
               <a:rPr lang="en-US" i="1" dirty="0">
                 <a:latin typeface="Arial Black" panose="020B0A04020102020204" pitchFamily="34" charset="0"/>
               </a:rPr>
-              <a:t>SOAR </a:t>
+              <a:t>SOAR-1 </a:t>
             </a:r>
             <a:r>
               <a:rPr lang="en-US" dirty="0">
@@ -20117,7 +20123,7 @@
           <a:p>
             <a:r>
               <a:rPr lang="en-US" dirty="0"/>
-              <a:t>7/19/2022</a:t>
+              <a:t>10/3/2022</a:t>
             </a:r>
           </a:p>
         </p:txBody>
@@ -20464,7 +20470,7 @@
           <a:p>
             <a:r>
               <a:rPr lang="en-US" dirty="0"/>
-              <a:t>7/19/2022</a:t>
+              <a:t>10/3/2022</a:t>
             </a:r>
           </a:p>
         </p:txBody>
@@ -20683,7 +20689,7 @@
           <a:p>
             <a:r>
               <a:rPr lang="en-US" dirty="0"/>
-              <a:t>7/19/2022</a:t>
+              <a:t>10/3/2022</a:t>
             </a:r>
           </a:p>
         </p:txBody>

</xml_diff>